<commit_message>
Updating models train / validation notebooks
</commit_message>
<xml_diff>
--- a/presentation/presentation.pptx
+++ b/presentation/presentation.pptx
@@ -298,7 +298,7 @@
       </p15:sldGuideLst>
     </p:ext>
     <p:ext uri="GoogleSlidesCustomDataVersion2">
-      <go:slidesCustomData xmlns:go="http://customooxmlschemas.google.com/" r:id="rId37" roundtripDataSignature="AMtx7mg/arx++HXcFdP6ceAzhbkVjG3ysw=="/>
+      <go:slidesCustomData xmlns:go="http://customooxmlschemas.google.com/" r:id="rId37" roundtripDataSignature="AMtx7mjMNb3VfCCBaWrTUIWHR9uHyrbisA=="/>
     </p:ext>
   </p:extLst>
 </p:presentation>
@@ -3259,7 +3259,7 @@
           </a:prstGeom>
           <a:solidFill>
             <a:schemeClr val="lt1">
-              <a:alpha val="1960"/>
+              <a:alpha val="1568"/>
             </a:schemeClr>
           </a:solidFill>
           <a:ln>
@@ -3336,7 +3336,7 @@
             </a:prstGeom>
             <a:solidFill>
               <a:schemeClr val="lt1">
-                <a:alpha val="1960"/>
+                <a:alpha val="1568"/>
               </a:schemeClr>
             </a:solidFill>
             <a:ln>
@@ -3399,7 +3399,7 @@
             </a:prstGeom>
             <a:solidFill>
               <a:schemeClr val="lt1">
-                <a:alpha val="1960"/>
+                <a:alpha val="1568"/>
               </a:schemeClr>
             </a:solidFill>
             <a:ln>
@@ -4215,7 +4215,7 @@
             </a:prstGeom>
             <a:solidFill>
               <a:schemeClr val="lt1">
-                <a:alpha val="2352"/>
+                <a:alpha val="1960"/>
               </a:schemeClr>
             </a:solidFill>
             <a:ln>
@@ -4278,7 +4278,7 @@
             </a:prstGeom>
             <a:solidFill>
               <a:schemeClr val="lt1">
-                <a:alpha val="2352"/>
+                <a:alpha val="1960"/>
               </a:schemeClr>
             </a:solidFill>
             <a:ln>
@@ -4341,7 +4341,7 @@
             </a:prstGeom>
             <a:solidFill>
               <a:schemeClr val="lt1">
-                <a:alpha val="6274"/>
+                <a:alpha val="5882"/>
               </a:schemeClr>
             </a:solidFill>
             <a:ln>
@@ -4404,7 +4404,7 @@
             </a:prstGeom>
             <a:solidFill>
               <a:schemeClr val="lt1">
-                <a:alpha val="6274"/>
+                <a:alpha val="5882"/>
               </a:schemeClr>
             </a:solidFill>
             <a:ln>
@@ -4467,7 +4467,7 @@
             </a:prstGeom>
             <a:solidFill>
               <a:schemeClr val="lt1">
-                <a:alpha val="6274"/>
+                <a:alpha val="5882"/>
               </a:schemeClr>
             </a:solidFill>
             <a:ln>
@@ -4530,7 +4530,7 @@
             </a:prstGeom>
             <a:solidFill>
               <a:schemeClr val="lt1">
-                <a:alpha val="6274"/>
+                <a:alpha val="5882"/>
               </a:schemeClr>
             </a:solidFill>
             <a:ln>
@@ -4593,7 +4593,7 @@
             </a:prstGeom>
             <a:solidFill>
               <a:schemeClr val="lt1">
-                <a:alpha val="6274"/>
+                <a:alpha val="5882"/>
               </a:schemeClr>
             </a:solidFill>
             <a:ln>
@@ -4717,7 +4717,7 @@
             </a:prstGeom>
             <a:solidFill>
               <a:schemeClr val="lt1">
-                <a:alpha val="6274"/>
+                <a:alpha val="5882"/>
               </a:schemeClr>
             </a:solidFill>
             <a:ln>
@@ -4780,7 +4780,7 @@
             </a:prstGeom>
             <a:solidFill>
               <a:schemeClr val="lt1">
-                <a:alpha val="6274"/>
+                <a:alpha val="5882"/>
               </a:schemeClr>
             </a:solidFill>
             <a:ln>
@@ -4843,7 +4843,7 @@
             </a:prstGeom>
             <a:solidFill>
               <a:schemeClr val="lt1">
-                <a:alpha val="6274"/>
+                <a:alpha val="5882"/>
               </a:schemeClr>
             </a:solidFill>
             <a:ln>
@@ -4906,7 +4906,7 @@
             </a:prstGeom>
             <a:solidFill>
               <a:schemeClr val="lt1">
-                <a:alpha val="6274"/>
+                <a:alpha val="5882"/>
               </a:schemeClr>
             </a:solidFill>
             <a:ln>
@@ -4969,7 +4969,7 @@
             </a:prstGeom>
             <a:solidFill>
               <a:schemeClr val="lt1">
-                <a:alpha val="6274"/>
+                <a:alpha val="5882"/>
               </a:schemeClr>
             </a:solidFill>
             <a:ln>
@@ -5093,7 +5093,7 @@
             </a:prstGeom>
             <a:solidFill>
               <a:schemeClr val="lt1">
-                <a:alpha val="6274"/>
+                <a:alpha val="5882"/>
               </a:schemeClr>
             </a:solidFill>
             <a:ln>
@@ -5156,7 +5156,7 @@
             </a:prstGeom>
             <a:solidFill>
               <a:schemeClr val="lt1">
-                <a:alpha val="6274"/>
+                <a:alpha val="5882"/>
               </a:schemeClr>
             </a:solidFill>
             <a:ln>
@@ -5219,7 +5219,7 @@
             </a:prstGeom>
             <a:solidFill>
               <a:schemeClr val="lt1">
-                <a:alpha val="6274"/>
+                <a:alpha val="5882"/>
               </a:schemeClr>
             </a:solidFill>
             <a:ln>
@@ -5282,7 +5282,7 @@
             </a:prstGeom>
             <a:solidFill>
               <a:schemeClr val="lt1">
-                <a:alpha val="6274"/>
+                <a:alpha val="5882"/>
               </a:schemeClr>
             </a:solidFill>
             <a:ln>
@@ -6725,7 +6725,7 @@
             </a:prstGeom>
             <a:solidFill>
               <a:schemeClr val="lt1">
-                <a:alpha val="2352"/>
+                <a:alpha val="1960"/>
               </a:schemeClr>
             </a:solidFill>
             <a:ln>
@@ -6788,7 +6788,7 @@
             </a:prstGeom>
             <a:solidFill>
               <a:schemeClr val="lt1">
-                <a:alpha val="2352"/>
+                <a:alpha val="1960"/>
               </a:schemeClr>
             </a:solidFill>
             <a:ln>
@@ -6851,7 +6851,7 @@
             </a:prstGeom>
             <a:solidFill>
               <a:schemeClr val="lt1">
-                <a:alpha val="6274"/>
+                <a:alpha val="5882"/>
               </a:schemeClr>
             </a:solidFill>
             <a:ln>
@@ -6914,7 +6914,7 @@
             </a:prstGeom>
             <a:solidFill>
               <a:schemeClr val="lt1">
-                <a:alpha val="6274"/>
+                <a:alpha val="5882"/>
               </a:schemeClr>
             </a:solidFill>
             <a:ln>
@@ -6977,7 +6977,7 @@
             </a:prstGeom>
             <a:solidFill>
               <a:schemeClr val="lt1">
-                <a:alpha val="6274"/>
+                <a:alpha val="5882"/>
               </a:schemeClr>
             </a:solidFill>
             <a:ln>
@@ -7040,7 +7040,7 @@
             </a:prstGeom>
             <a:solidFill>
               <a:schemeClr val="lt1">
-                <a:alpha val="6274"/>
+                <a:alpha val="5882"/>
               </a:schemeClr>
             </a:solidFill>
             <a:ln>
@@ -7103,7 +7103,7 @@
             </a:prstGeom>
             <a:solidFill>
               <a:schemeClr val="lt1">
-                <a:alpha val="6274"/>
+                <a:alpha val="5882"/>
               </a:schemeClr>
             </a:solidFill>
             <a:ln>
@@ -7227,7 +7227,7 @@
             </a:prstGeom>
             <a:solidFill>
               <a:schemeClr val="lt1">
-                <a:alpha val="6274"/>
+                <a:alpha val="5882"/>
               </a:schemeClr>
             </a:solidFill>
             <a:ln>
@@ -7290,7 +7290,7 @@
             </a:prstGeom>
             <a:solidFill>
               <a:schemeClr val="lt1">
-                <a:alpha val="6274"/>
+                <a:alpha val="5882"/>
               </a:schemeClr>
             </a:solidFill>
             <a:ln>
@@ -7353,7 +7353,7 @@
             </a:prstGeom>
             <a:solidFill>
               <a:schemeClr val="lt1">
-                <a:alpha val="6274"/>
+                <a:alpha val="5882"/>
               </a:schemeClr>
             </a:solidFill>
             <a:ln>
@@ -7416,7 +7416,7 @@
             </a:prstGeom>
             <a:solidFill>
               <a:schemeClr val="lt1">
-                <a:alpha val="6274"/>
+                <a:alpha val="5882"/>
               </a:schemeClr>
             </a:solidFill>
             <a:ln>
@@ -7479,7 +7479,7 @@
             </a:prstGeom>
             <a:solidFill>
               <a:schemeClr val="lt1">
-                <a:alpha val="6274"/>
+                <a:alpha val="5882"/>
               </a:schemeClr>
             </a:solidFill>
             <a:ln>
@@ -7603,7 +7603,7 @@
             </a:prstGeom>
             <a:solidFill>
               <a:schemeClr val="lt1">
-                <a:alpha val="6274"/>
+                <a:alpha val="5882"/>
               </a:schemeClr>
             </a:solidFill>
             <a:ln>
@@ -7666,7 +7666,7 @@
             </a:prstGeom>
             <a:solidFill>
               <a:schemeClr val="lt1">
-                <a:alpha val="6274"/>
+                <a:alpha val="5882"/>
               </a:schemeClr>
             </a:solidFill>
             <a:ln>
@@ -7729,7 +7729,7 @@
             </a:prstGeom>
             <a:solidFill>
               <a:schemeClr val="lt1">
-                <a:alpha val="6274"/>
+                <a:alpha val="5882"/>
               </a:schemeClr>
             </a:solidFill>
             <a:ln>
@@ -7792,7 +7792,7 @@
             </a:prstGeom>
             <a:solidFill>
               <a:schemeClr val="lt1">
-                <a:alpha val="6274"/>
+                <a:alpha val="5882"/>
               </a:schemeClr>
             </a:solidFill>
             <a:ln>
@@ -10433,7 +10433,7 @@
             </a:prstGeom>
             <a:solidFill>
               <a:schemeClr val="lt1">
-                <a:alpha val="2352"/>
+                <a:alpha val="1960"/>
               </a:schemeClr>
             </a:solidFill>
             <a:ln>
@@ -10496,7 +10496,7 @@
             </a:prstGeom>
             <a:solidFill>
               <a:schemeClr val="lt1">
-                <a:alpha val="2352"/>
+                <a:alpha val="1960"/>
               </a:schemeClr>
             </a:solidFill>
             <a:ln>
@@ -10559,7 +10559,7 @@
             </a:prstGeom>
             <a:solidFill>
               <a:schemeClr val="lt1">
-                <a:alpha val="6274"/>
+                <a:alpha val="5882"/>
               </a:schemeClr>
             </a:solidFill>
             <a:ln>
@@ -10622,7 +10622,7 @@
             </a:prstGeom>
             <a:solidFill>
               <a:schemeClr val="lt1">
-                <a:alpha val="6274"/>
+                <a:alpha val="5882"/>
               </a:schemeClr>
             </a:solidFill>
             <a:ln>
@@ -10685,7 +10685,7 @@
             </a:prstGeom>
             <a:solidFill>
               <a:schemeClr val="lt1">
-                <a:alpha val="6274"/>
+                <a:alpha val="5882"/>
               </a:schemeClr>
             </a:solidFill>
             <a:ln>
@@ -10748,7 +10748,7 @@
             </a:prstGeom>
             <a:solidFill>
               <a:schemeClr val="lt1">
-                <a:alpha val="6274"/>
+                <a:alpha val="5882"/>
               </a:schemeClr>
             </a:solidFill>
             <a:ln>
@@ -10811,7 +10811,7 @@
             </a:prstGeom>
             <a:solidFill>
               <a:schemeClr val="lt1">
-                <a:alpha val="6274"/>
+                <a:alpha val="5882"/>
               </a:schemeClr>
             </a:solidFill>
             <a:ln>
@@ -10935,7 +10935,7 @@
             </a:prstGeom>
             <a:solidFill>
               <a:schemeClr val="lt1">
-                <a:alpha val="6274"/>
+                <a:alpha val="5882"/>
               </a:schemeClr>
             </a:solidFill>
             <a:ln>
@@ -10998,7 +10998,7 @@
             </a:prstGeom>
             <a:solidFill>
               <a:schemeClr val="lt1">
-                <a:alpha val="6274"/>
+                <a:alpha val="5882"/>
               </a:schemeClr>
             </a:solidFill>
             <a:ln>
@@ -11061,7 +11061,7 @@
             </a:prstGeom>
             <a:solidFill>
               <a:schemeClr val="lt1">
-                <a:alpha val="6274"/>
+                <a:alpha val="5882"/>
               </a:schemeClr>
             </a:solidFill>
             <a:ln>
@@ -11124,7 +11124,7 @@
             </a:prstGeom>
             <a:solidFill>
               <a:schemeClr val="lt1">
-                <a:alpha val="6274"/>
+                <a:alpha val="5882"/>
               </a:schemeClr>
             </a:solidFill>
             <a:ln>
@@ -11187,7 +11187,7 @@
             </a:prstGeom>
             <a:solidFill>
               <a:schemeClr val="lt1">
-                <a:alpha val="6274"/>
+                <a:alpha val="5882"/>
               </a:schemeClr>
             </a:solidFill>
             <a:ln>
@@ -11311,7 +11311,7 @@
             </a:prstGeom>
             <a:solidFill>
               <a:schemeClr val="lt1">
-                <a:alpha val="6274"/>
+                <a:alpha val="5882"/>
               </a:schemeClr>
             </a:solidFill>
             <a:ln>
@@ -11374,7 +11374,7 @@
             </a:prstGeom>
             <a:solidFill>
               <a:schemeClr val="lt1">
-                <a:alpha val="6274"/>
+                <a:alpha val="5882"/>
               </a:schemeClr>
             </a:solidFill>
             <a:ln>
@@ -11437,7 +11437,7 @@
             </a:prstGeom>
             <a:solidFill>
               <a:schemeClr val="lt1">
-                <a:alpha val="6274"/>
+                <a:alpha val="5882"/>
               </a:schemeClr>
             </a:solidFill>
             <a:ln>
@@ -11500,7 +11500,7 @@
             </a:prstGeom>
             <a:solidFill>
               <a:schemeClr val="lt1">
-                <a:alpha val="6274"/>
+                <a:alpha val="5882"/>
               </a:schemeClr>
             </a:solidFill>
             <a:ln>
@@ -12947,7 +12947,7 @@
             </a:prstGeom>
             <a:solidFill>
               <a:schemeClr val="lt1">
-                <a:alpha val="8627"/>
+                <a:alpha val="8235"/>
               </a:schemeClr>
             </a:solidFill>
             <a:ln>
@@ -13010,7 +13010,7 @@
             </a:prstGeom>
             <a:solidFill>
               <a:schemeClr val="lt1">
-                <a:alpha val="8627"/>
+                <a:alpha val="8235"/>
               </a:schemeClr>
             </a:solidFill>
             <a:ln>
@@ -15043,7 +15043,7 @@
                 <a:cs typeface="Montserrat"/>
                 <a:sym typeface="Montserrat"/>
               </a:rPr>
-              <a:t>Big Data Project</a:t>
+              <a:t>Big Data Computing Project</a:t>
             </a:r>
             <a:endParaRPr b="0" i="0" sz="1400" u="none" cap="none" strike="noStrike">
               <a:solidFill>
@@ -15485,13 +15485,43 @@
               <a:buChar char="●"/>
             </a:pPr>
             <a:r>
+              <a:rPr lang="en" sz="1500">
+                <a:latin typeface="Montserrat"/>
+                <a:ea typeface="Montserrat"/>
+                <a:cs typeface="Montserrat"/>
+                <a:sym typeface="Montserrat"/>
+              </a:rPr>
+              <a:t>ML models:</a:t>
+            </a:r>
+            <a:endParaRPr sz="1500">
+              <a:latin typeface="Montserrat"/>
+              <a:ea typeface="Montserrat"/>
+              <a:cs typeface="Montserrat"/>
+              <a:sym typeface="Montserrat"/>
+            </a:endParaRPr>
+          </a:p>
+          <a:p>
+            <a:pPr indent="-323850" lvl="1" marL="914400" rtl="0" algn="l">
+              <a:lnSpc>
+                <a:spcPct val="115000"/>
+              </a:lnSpc>
+              <a:spcBef>
+                <a:spcPts val="0"/>
+              </a:spcBef>
+              <a:spcAft>
+                <a:spcPts val="0"/>
+              </a:spcAft>
+              <a:buSzPts val="1500"/>
+              <a:buChar char="○"/>
+            </a:pPr>
+            <a:r>
               <a:rPr b="1" lang="en" sz="1500">
                 <a:latin typeface="Montserrat"/>
                 <a:ea typeface="Montserrat"/>
                 <a:cs typeface="Montserrat"/>
                 <a:sym typeface="Montserrat"/>
               </a:rPr>
-              <a:t>ML models:</a:t>
+              <a:t>Linear Regression</a:t>
             </a:r>
             <a:endParaRPr b="1" sz="1500">
               <a:latin typeface="Montserrat"/>
@@ -15515,13 +15545,103 @@
               <a:buChar char="○"/>
             </a:pPr>
             <a:r>
+              <a:rPr b="1" lang="en" sz="1500">
+                <a:latin typeface="Montserrat"/>
+                <a:ea typeface="Montserrat"/>
+                <a:cs typeface="Montserrat"/>
+                <a:sym typeface="Montserrat"/>
+              </a:rPr>
+              <a:t>Generalized Linear Regression</a:t>
+            </a:r>
+            <a:endParaRPr b="1" sz="1500">
+              <a:latin typeface="Montserrat"/>
+              <a:ea typeface="Montserrat"/>
+              <a:cs typeface="Montserrat"/>
+              <a:sym typeface="Montserrat"/>
+            </a:endParaRPr>
+          </a:p>
+          <a:p>
+            <a:pPr indent="-323850" lvl="1" marL="914400" rtl="0" algn="l">
+              <a:lnSpc>
+                <a:spcPct val="115000"/>
+              </a:lnSpc>
+              <a:spcBef>
+                <a:spcPts val="0"/>
+              </a:spcBef>
+              <a:spcAft>
+                <a:spcPts val="0"/>
+              </a:spcAft>
+              <a:buSzPts val="1500"/>
+              <a:buChar char="○"/>
+            </a:pPr>
+            <a:r>
+              <a:rPr b="1" lang="en" sz="1500">
+                <a:latin typeface="Montserrat"/>
+                <a:ea typeface="Montserrat"/>
+                <a:cs typeface="Montserrat"/>
+                <a:sym typeface="Montserrat"/>
+              </a:rPr>
+              <a:t>Random Forest Regressor</a:t>
+            </a:r>
+            <a:endParaRPr b="1" sz="1500">
+              <a:latin typeface="Montserrat"/>
+              <a:ea typeface="Montserrat"/>
+              <a:cs typeface="Montserrat"/>
+              <a:sym typeface="Montserrat"/>
+            </a:endParaRPr>
+          </a:p>
+          <a:p>
+            <a:pPr indent="-323850" lvl="1" marL="914400" rtl="0" algn="l">
+              <a:lnSpc>
+                <a:spcPct val="115000"/>
+              </a:lnSpc>
+              <a:spcBef>
+                <a:spcPts val="0"/>
+              </a:spcBef>
+              <a:spcAft>
+                <a:spcPts val="0"/>
+              </a:spcAft>
+              <a:buSzPts val="1500"/>
+              <a:buChar char="○"/>
+            </a:pPr>
+            <a:r>
+              <a:rPr b="1" lang="en" sz="1500">
+                <a:latin typeface="Montserrat"/>
+                <a:ea typeface="Montserrat"/>
+                <a:cs typeface="Montserrat"/>
+                <a:sym typeface="Montserrat"/>
+              </a:rPr>
+              <a:t>Gradient Boosting Tree Regressor</a:t>
+            </a:r>
+            <a:endParaRPr b="1" sz="1500">
+              <a:latin typeface="Montserrat"/>
+              <a:ea typeface="Montserrat"/>
+              <a:cs typeface="Montserrat"/>
+              <a:sym typeface="Montserrat"/>
+            </a:endParaRPr>
+          </a:p>
+          <a:p>
+            <a:pPr indent="-323850" lvl="0" marL="457200" rtl="0" algn="l">
+              <a:lnSpc>
+                <a:spcPct val="115000"/>
+              </a:lnSpc>
+              <a:spcBef>
+                <a:spcPts val="0"/>
+              </a:spcBef>
+              <a:spcAft>
+                <a:spcPts val="0"/>
+              </a:spcAft>
+              <a:buSzPts val="1500"/>
+              <a:buChar char="●"/>
+            </a:pPr>
+            <a:r>
               <a:rPr lang="en" sz="1500">
                 <a:latin typeface="Montserrat"/>
                 <a:ea typeface="Montserrat"/>
                 <a:cs typeface="Montserrat"/>
                 <a:sym typeface="Montserrat"/>
               </a:rPr>
-              <a:t>Linear Regression</a:t>
+              <a:t>Metrics:</a:t>
             </a:r>
             <a:endParaRPr sz="1500">
               <a:latin typeface="Montserrat"/>
@@ -15545,103 +15665,13 @@
               <a:buChar char="○"/>
             </a:pPr>
             <a:r>
-              <a:rPr lang="en" sz="1500">
-                <a:latin typeface="Montserrat"/>
-                <a:ea typeface="Montserrat"/>
-                <a:cs typeface="Montserrat"/>
-                <a:sym typeface="Montserrat"/>
-              </a:rPr>
-              <a:t>Generalized Linear Regression</a:t>
-            </a:r>
-            <a:endParaRPr sz="1500">
-              <a:latin typeface="Montserrat"/>
-              <a:ea typeface="Montserrat"/>
-              <a:cs typeface="Montserrat"/>
-              <a:sym typeface="Montserrat"/>
-            </a:endParaRPr>
-          </a:p>
-          <a:p>
-            <a:pPr indent="-323850" lvl="1" marL="914400" rtl="0" algn="l">
-              <a:lnSpc>
-                <a:spcPct val="115000"/>
-              </a:lnSpc>
-              <a:spcBef>
-                <a:spcPts val="0"/>
-              </a:spcBef>
-              <a:spcAft>
-                <a:spcPts val="0"/>
-              </a:spcAft>
-              <a:buSzPts val="1500"/>
-              <a:buChar char="○"/>
-            </a:pPr>
-            <a:r>
-              <a:rPr lang="en" sz="1500">
-                <a:latin typeface="Montserrat"/>
-                <a:ea typeface="Montserrat"/>
-                <a:cs typeface="Montserrat"/>
-                <a:sym typeface="Montserrat"/>
-              </a:rPr>
-              <a:t>Random Forest Regressor</a:t>
-            </a:r>
-            <a:endParaRPr sz="1500">
-              <a:latin typeface="Montserrat"/>
-              <a:ea typeface="Montserrat"/>
-              <a:cs typeface="Montserrat"/>
-              <a:sym typeface="Montserrat"/>
-            </a:endParaRPr>
-          </a:p>
-          <a:p>
-            <a:pPr indent="-323850" lvl="1" marL="914400" rtl="0" algn="l">
-              <a:lnSpc>
-                <a:spcPct val="115000"/>
-              </a:lnSpc>
-              <a:spcBef>
-                <a:spcPts val="0"/>
-              </a:spcBef>
-              <a:spcAft>
-                <a:spcPts val="0"/>
-              </a:spcAft>
-              <a:buSzPts val="1500"/>
-              <a:buChar char="○"/>
-            </a:pPr>
-            <a:r>
-              <a:rPr lang="en" sz="1500">
-                <a:latin typeface="Montserrat"/>
-                <a:ea typeface="Montserrat"/>
-                <a:cs typeface="Montserrat"/>
-                <a:sym typeface="Montserrat"/>
-              </a:rPr>
-              <a:t>Gradient Boosting Tree Regressor</a:t>
-            </a:r>
-            <a:endParaRPr sz="1500">
-              <a:latin typeface="Montserrat"/>
-              <a:ea typeface="Montserrat"/>
-              <a:cs typeface="Montserrat"/>
-              <a:sym typeface="Montserrat"/>
-            </a:endParaRPr>
-          </a:p>
-          <a:p>
-            <a:pPr indent="-323850" lvl="0" marL="457200" rtl="0" algn="l">
-              <a:lnSpc>
-                <a:spcPct val="115000"/>
-              </a:lnSpc>
-              <a:spcBef>
-                <a:spcPts val="0"/>
-              </a:spcBef>
-              <a:spcAft>
-                <a:spcPts val="0"/>
-              </a:spcAft>
-              <a:buSzPts val="1500"/>
-              <a:buChar char="●"/>
-            </a:pPr>
-            <a:r>
               <a:rPr b="1" lang="en" sz="1500">
                 <a:latin typeface="Montserrat"/>
                 <a:ea typeface="Montserrat"/>
                 <a:cs typeface="Montserrat"/>
                 <a:sym typeface="Montserrat"/>
               </a:rPr>
-              <a:t>Metrics:</a:t>
+              <a:t>RMSE (Root Mean Squared Error)</a:t>
             </a:r>
             <a:endParaRPr b="1" sz="1500">
               <a:latin typeface="Montserrat"/>
@@ -15665,15 +15695,15 @@
               <a:buChar char="○"/>
             </a:pPr>
             <a:r>
-              <a:rPr lang="en" sz="1500">
+              <a:rPr b="1" lang="en" sz="1500">
                 <a:latin typeface="Montserrat"/>
                 <a:ea typeface="Montserrat"/>
                 <a:cs typeface="Montserrat"/>
                 <a:sym typeface="Montserrat"/>
               </a:rPr>
-              <a:t>RMSE (Root Mean Squared Error)</a:t>
+              <a:t>MSE (Mean Squared Error)</a:t>
             </a:r>
-            <a:endParaRPr sz="1500">
+            <a:endParaRPr b="1" sz="1500">
               <a:latin typeface="Montserrat"/>
               <a:ea typeface="Montserrat"/>
               <a:cs typeface="Montserrat"/>
@@ -15695,15 +15725,15 @@
               <a:buChar char="○"/>
             </a:pPr>
             <a:r>
-              <a:rPr lang="en" sz="1500">
+              <a:rPr b="1" lang="en" sz="1500">
                 <a:latin typeface="Montserrat"/>
                 <a:ea typeface="Montserrat"/>
                 <a:cs typeface="Montserrat"/>
                 <a:sym typeface="Montserrat"/>
               </a:rPr>
-              <a:t>MSE (Mean Squared Error)</a:t>
+              <a:t>MAE (Mean Absolute Error)</a:t>
             </a:r>
-            <a:endParaRPr sz="1500">
+            <a:endParaRPr b="1" sz="1500">
               <a:latin typeface="Montserrat"/>
               <a:ea typeface="Montserrat"/>
               <a:cs typeface="Montserrat"/>
@@ -15725,15 +15755,15 @@
               <a:buChar char="○"/>
             </a:pPr>
             <a:r>
-              <a:rPr lang="en" sz="1500">
+              <a:rPr b="1" lang="en" sz="1500">
                 <a:latin typeface="Montserrat"/>
                 <a:ea typeface="Montserrat"/>
                 <a:cs typeface="Montserrat"/>
                 <a:sym typeface="Montserrat"/>
               </a:rPr>
-              <a:t>MAE (Mean Absolute Error)</a:t>
+              <a:t>MAPE (Mean Absolute Percentage Error)</a:t>
             </a:r>
-            <a:endParaRPr sz="1500">
+            <a:endParaRPr b="1" sz="1500">
               <a:latin typeface="Montserrat"/>
               <a:ea typeface="Montserrat"/>
               <a:cs typeface="Montserrat"/>
@@ -15755,15 +15785,15 @@
               <a:buChar char="○"/>
             </a:pPr>
             <a:r>
-              <a:rPr lang="en" sz="1500">
+              <a:rPr b="1" lang="en" sz="1500">
                 <a:latin typeface="Montserrat"/>
                 <a:ea typeface="Montserrat"/>
                 <a:cs typeface="Montserrat"/>
                 <a:sym typeface="Montserrat"/>
               </a:rPr>
-              <a:t>MAPE (Mean Absolute Percentage Error)</a:t>
+              <a:t>R2 (R-squared)</a:t>
             </a:r>
-            <a:endParaRPr sz="1500">
+            <a:endParaRPr b="1" sz="1500">
               <a:latin typeface="Montserrat"/>
               <a:ea typeface="Montserrat"/>
               <a:cs typeface="Montserrat"/>
@@ -15785,37 +15815,7 @@
               <a:buChar char="○"/>
             </a:pPr>
             <a:r>
-              <a:rPr lang="en" sz="1500">
-                <a:latin typeface="Montserrat"/>
-                <a:ea typeface="Montserrat"/>
-                <a:cs typeface="Montserrat"/>
-                <a:sym typeface="Montserrat"/>
-              </a:rPr>
-              <a:t>R2 (R-squared)</a:t>
-            </a:r>
-            <a:endParaRPr sz="1500">
-              <a:latin typeface="Montserrat"/>
-              <a:ea typeface="Montserrat"/>
-              <a:cs typeface="Montserrat"/>
-              <a:sym typeface="Montserrat"/>
-            </a:endParaRPr>
-          </a:p>
-          <a:p>
-            <a:pPr indent="-323850" lvl="1" marL="914400" rtl="0" algn="l">
-              <a:lnSpc>
-                <a:spcPct val="115000"/>
-              </a:lnSpc>
-              <a:spcBef>
-                <a:spcPts val="0"/>
-              </a:spcBef>
-              <a:spcAft>
-                <a:spcPts val="0"/>
-              </a:spcAft>
-              <a:buSzPts val="1500"/>
-              <a:buChar char="○"/>
-            </a:pPr>
-            <a:r>
-              <a:rPr lang="en" sz="1500">
+              <a:rPr b="1" lang="en" sz="1500">
                 <a:latin typeface="Montserrat"/>
                 <a:ea typeface="Montserrat"/>
                 <a:cs typeface="Montserrat"/>
@@ -15823,7 +15823,7 @@
               </a:rPr>
               <a:t>Adjusted R2</a:t>
             </a:r>
-            <a:endParaRPr sz="1500">
+            <a:endParaRPr b="1" sz="1500">
               <a:latin typeface="Montserrat"/>
               <a:ea typeface="Montserrat"/>
               <a:cs typeface="Montserrat"/>
@@ -16009,7 +16009,16 @@
                 <a:cs typeface="Montserrat"/>
                 <a:sym typeface="Montserrat"/>
               </a:rPr>
-              <a:t>Accuracy</a:t>
+              <a:t>a</a:t>
+            </a:r>
+            <a:r>
+              <a:rPr b="1" lang="en" sz="1500">
+                <a:latin typeface="Montserrat"/>
+                <a:ea typeface="Montserrat"/>
+                <a:cs typeface="Montserrat"/>
+                <a:sym typeface="Montserrat"/>
+              </a:rPr>
+              <a:t>ccuracy:</a:t>
             </a:r>
             <a:endParaRPr b="1" sz="1500">
               <a:latin typeface="Montserrat"/>
@@ -16019,7 +16028,7 @@
             </a:endParaRPr>
           </a:p>
           <a:p>
-            <a:pPr indent="-323850" lvl="0" marL="457200" rtl="0" algn="l">
+            <a:pPr indent="-323850" lvl="1" marL="914400" rtl="0" algn="l">
               <a:lnSpc>
                 <a:spcPct val="115000"/>
               </a:lnSpc>
@@ -16030,7 +16039,7 @@
                 <a:spcPts val="0"/>
               </a:spcAft>
               <a:buSzPts val="1500"/>
-              <a:buChar char="●"/>
+              <a:buChar char="○"/>
             </a:pPr>
             <a:r>
               <a:rPr lang="en" sz="1500">
@@ -16049,7 +16058,7 @@
             </a:endParaRPr>
           </a:p>
           <a:p>
-            <a:pPr indent="-323850" lvl="1" marL="914400" rtl="0" algn="l">
+            <a:pPr indent="-323850" lvl="2" marL="1371600" rtl="0" algn="l">
               <a:lnSpc>
                 <a:spcPct val="115000"/>
               </a:lnSpc>
@@ -16060,7 +16069,7 @@
                 <a:spcPts val="0"/>
               </a:spcAft>
               <a:buSzPts val="1500"/>
-              <a:buChar char="○"/>
+              <a:buChar char="■"/>
             </a:pPr>
             <a:r>
               <a:rPr lang="en" sz="1500">
@@ -16079,7 +16088,7 @@
             </a:endParaRPr>
           </a:p>
           <a:p>
-            <a:pPr indent="-323850" lvl="1" marL="914400" rtl="0" algn="l">
+            <a:pPr indent="-323850" lvl="2" marL="1371600" rtl="0" algn="l">
               <a:lnSpc>
                 <a:spcPct val="115000"/>
               </a:lnSpc>
@@ -16090,7 +16099,7 @@
                 <a:spcPts val="0"/>
               </a:spcAft>
               <a:buSzPts val="1500"/>
-              <a:buChar char="○"/>
+              <a:buChar char="■"/>
             </a:pPr>
             <a:r>
               <a:rPr lang="en" sz="1500">
@@ -16109,7 +16118,7 @@
             </a:endParaRPr>
           </a:p>
           <a:p>
-            <a:pPr indent="-323850" lvl="1" marL="914400" rtl="0" algn="l">
+            <a:pPr indent="-323850" lvl="2" marL="1371600" rtl="0" algn="l">
               <a:lnSpc>
                 <a:spcPct val="115000"/>
               </a:lnSpc>
@@ -16120,7 +16129,7 @@
                 <a:spcPts val="0"/>
               </a:spcAft>
               <a:buSzPts val="1500"/>
-              <a:buChar char="○"/>
+              <a:buChar char="■"/>
             </a:pPr>
             <a:r>
               <a:rPr lang="en" sz="1500">
@@ -16139,7 +16148,7 @@
             </a:endParaRPr>
           </a:p>
           <a:p>
-            <a:pPr indent="-323850" lvl="1" marL="914400" rtl="0" algn="l">
+            <a:pPr indent="-323850" lvl="2" marL="1371600" rtl="0" algn="l">
               <a:lnSpc>
                 <a:spcPct val="115000"/>
               </a:lnSpc>
@@ -16150,7 +16159,7 @@
                 <a:spcPts val="0"/>
               </a:spcAft>
               <a:buSzPts val="1500"/>
-              <a:buChar char="○"/>
+              <a:buChar char="■"/>
             </a:pPr>
             <a:r>
               <a:rPr lang="en" sz="1500">
@@ -16335,45 +16344,6 @@
               <a:buChar char="●"/>
             </a:pPr>
             <a:r>
-              <a:rPr lang="en" sz="1500">
-                <a:solidFill>
-                  <a:srgbClr val="FFFFFF"/>
-                </a:solidFill>
-                <a:latin typeface="Montserrat"/>
-                <a:ea typeface="Montserrat"/>
-                <a:cs typeface="Montserrat"/>
-                <a:sym typeface="Montserrat"/>
-              </a:rPr>
-              <a:t>Train / validation pipeline:</a:t>
-            </a:r>
-            <a:endParaRPr sz="1500">
-              <a:solidFill>
-                <a:srgbClr val="FFFFFF"/>
-              </a:solidFill>
-              <a:latin typeface="Montserrat"/>
-              <a:ea typeface="Montserrat"/>
-              <a:cs typeface="Montserrat"/>
-              <a:sym typeface="Montserrat"/>
-            </a:endParaRPr>
-          </a:p>
-          <a:p>
-            <a:pPr indent="-323850" lvl="1" marL="914400" rtl="0" algn="l">
-              <a:lnSpc>
-                <a:spcPct val="115000"/>
-              </a:lnSpc>
-              <a:spcBef>
-                <a:spcPts val="0"/>
-              </a:spcBef>
-              <a:spcAft>
-                <a:spcPts val="0"/>
-              </a:spcAft>
-              <a:buClr>
-                <a:srgbClr val="FFFFFF"/>
-              </a:buClr>
-              <a:buSzPts val="1500"/>
-              <a:buChar char="○"/>
-            </a:pPr>
-            <a:r>
               <a:rPr b="1" lang="en" sz="1500">
                 <a:solidFill>
                   <a:srgbClr val="FFFFFF"/>
@@ -16408,7 +16378,7 @@
             </a:endParaRPr>
           </a:p>
           <a:p>
-            <a:pPr indent="-323850" lvl="1" marL="914400" rtl="0" algn="l">
+            <a:pPr indent="-323850" lvl="0" marL="457200" rtl="0" algn="l">
               <a:lnSpc>
                 <a:spcPct val="115000"/>
               </a:lnSpc>
@@ -16422,7 +16392,7 @@
                 <a:srgbClr val="FFFFFF"/>
               </a:buClr>
               <a:buSzPts val="1500"/>
-              <a:buChar char="○"/>
+              <a:buChar char="●"/>
             </a:pPr>
             <a:r>
               <a:rPr b="1" lang="en" sz="1500">
@@ -17274,7 +17244,7 @@
               <a:buChar char="○"/>
             </a:pPr>
             <a:r>
-              <a:rPr lang="en" sz="1500">
+              <a:rPr b="1" lang="en" sz="1500">
                 <a:latin typeface="Montserrat"/>
                 <a:ea typeface="Montserrat"/>
                 <a:cs typeface="Montserrat"/>
@@ -17282,7 +17252,7 @@
               </a:rPr>
               <a:t>1 week</a:t>
             </a:r>
-            <a:endParaRPr sz="1500">
+            <a:endParaRPr b="1" sz="1500">
               <a:latin typeface="Montserrat"/>
               <a:ea typeface="Montserrat"/>
               <a:cs typeface="Montserrat"/>
@@ -17305,7 +17275,7 @@
               <a:buChar char="○"/>
             </a:pPr>
             <a:r>
-              <a:rPr lang="en" sz="1500">
+              <a:rPr b="1" lang="en" sz="1500">
                 <a:latin typeface="Montserrat"/>
                 <a:ea typeface="Montserrat"/>
                 <a:cs typeface="Montserrat"/>
@@ -17313,7 +17283,7 @@
               </a:rPr>
               <a:t>15 days</a:t>
             </a:r>
-            <a:endParaRPr sz="1500">
+            <a:endParaRPr b="1" sz="1500">
               <a:latin typeface="Montserrat"/>
               <a:ea typeface="Montserrat"/>
               <a:cs typeface="Montserrat"/>
@@ -17336,7 +17306,7 @@
               <a:buChar char="○"/>
             </a:pPr>
             <a:r>
-              <a:rPr lang="en" sz="1500">
+              <a:rPr b="1" lang="en" sz="1500">
                 <a:latin typeface="Montserrat"/>
                 <a:ea typeface="Montserrat"/>
                 <a:cs typeface="Montserrat"/>
@@ -17344,7 +17314,7 @@
               </a:rPr>
               <a:t>1 month</a:t>
             </a:r>
-            <a:endParaRPr sz="1500">
+            <a:endParaRPr b="1" sz="1500">
               <a:latin typeface="Montserrat"/>
               <a:ea typeface="Montserrat"/>
               <a:cs typeface="Montserrat"/>
@@ -17367,7 +17337,7 @@
               <a:buChar char="○"/>
             </a:pPr>
             <a:r>
-              <a:rPr lang="en" sz="1500">
+              <a:rPr b="1" lang="en" sz="1500">
                 <a:latin typeface="Montserrat"/>
                 <a:ea typeface="Montserrat"/>
                 <a:cs typeface="Montserrat"/>
@@ -17375,7 +17345,7 @@
               </a:rPr>
               <a:t>3 months</a:t>
             </a:r>
-            <a:endParaRPr sz="1500">
+            <a:endParaRPr b="1" sz="1500">
               <a:latin typeface="Montserrat"/>
               <a:ea typeface="Montserrat"/>
               <a:cs typeface="Montserrat"/>
@@ -17996,16 +17966,7 @@
                 <a:cs typeface="Montserrat"/>
                 <a:sym typeface="Montserrat"/>
               </a:rPr>
-              <a:t>Test d</a:t>
-            </a:r>
-            <a:r>
-              <a:rPr lang="en" sz="1500">
-                <a:latin typeface="Montserrat"/>
-                <a:ea typeface="Montserrat"/>
-                <a:cs typeface="Montserrat"/>
-                <a:sym typeface="Montserrat"/>
-              </a:rPr>
-              <a:t>ataset splitting</a:t>
+              <a:t>Test dataset splitting</a:t>
             </a:r>
             <a:endParaRPr b="1" sz="1500">
               <a:latin typeface="Montserrat"/>
@@ -18185,16 +18146,7 @@
                 <a:cs typeface="Montserrat"/>
                 <a:sym typeface="Montserrat"/>
               </a:rPr>
-              <a:t>F</a:t>
-            </a:r>
-            <a:r>
-              <a:rPr lang="en" sz="1500">
-                <a:latin typeface="Montserrat"/>
-                <a:ea typeface="Montserrat"/>
-                <a:cs typeface="Montserrat"/>
-                <a:sym typeface="Montserrat"/>
-              </a:rPr>
-              <a:t>eatures</a:t>
+              <a:t>Features</a:t>
             </a:r>
             <a:endParaRPr sz="1500">
               <a:latin typeface="Montserrat"/>
@@ -19085,16 +19037,7 @@
                 <a:cs typeface="Montserrat"/>
                 <a:sym typeface="Montserrat"/>
               </a:rPr>
-              <a:t>Prediction </a:t>
-            </a:r>
-            <a:r>
-              <a:rPr b="1" lang="en" sz="1500">
-                <a:latin typeface="Montserrat"/>
-                <a:ea typeface="Montserrat"/>
-                <a:cs typeface="Montserrat"/>
-                <a:sym typeface="Montserrat"/>
-              </a:rPr>
-              <a:t>of Bitcoin prices can be a competitive advantage</a:t>
+              <a:t>Prediction of Bitcoin prices can be a competitive advantage</a:t>
             </a:r>
             <a:endParaRPr b="1" sz="1500">
               <a:latin typeface="Montserrat"/>
@@ -19590,25 +19533,7 @@
                 <a:cs typeface="Montserrat"/>
                 <a:sym typeface="Montserrat"/>
               </a:rPr>
-              <a:t>Collecting </a:t>
-            </a:r>
-            <a:r>
-              <a:rPr lang="en" sz="1500">
-                <a:latin typeface="Montserrat"/>
-                <a:ea typeface="Montserrat"/>
-                <a:cs typeface="Montserrat"/>
-                <a:sym typeface="Montserrat"/>
-              </a:rPr>
-              <a:t>Bitcoin </a:t>
-            </a:r>
-            <a:r>
-              <a:rPr lang="en" sz="1500">
-                <a:latin typeface="Montserrat"/>
-                <a:ea typeface="Montserrat"/>
-                <a:cs typeface="Montserrat"/>
-                <a:sym typeface="Montserrat"/>
-              </a:rPr>
-              <a:t>data using:</a:t>
+              <a:t>Collecting Bitcoin data using:</a:t>
             </a:r>
             <a:endParaRPr sz="1500">
               <a:latin typeface="Montserrat"/>
@@ -19632,13 +19557,22 @@
               <a:buChar char="○"/>
             </a:pPr>
             <a:r>
+              <a:rPr b="1" lang="en" sz="1500">
+                <a:latin typeface="Montserrat"/>
+                <a:ea typeface="Montserrat"/>
+                <a:cs typeface="Montserrat"/>
+                <a:sym typeface="Montserrat"/>
+              </a:rPr>
+              <a:t>Blockchain.org</a:t>
+            </a:r>
+            <a:r>
               <a:rPr lang="en" sz="1500">
                 <a:latin typeface="Montserrat"/>
                 <a:ea typeface="Montserrat"/>
                 <a:cs typeface="Montserrat"/>
                 <a:sym typeface="Montserrat"/>
               </a:rPr>
-              <a:t>Blockchain.org (blockchain data)</a:t>
+              <a:t> (blockchain data)</a:t>
             </a:r>
             <a:endParaRPr sz="1500">
               <a:latin typeface="Montserrat"/>
@@ -19662,13 +19596,22 @@
               <a:buChar char="○"/>
             </a:pPr>
             <a:r>
+              <a:rPr b="1" lang="en" sz="1500">
+                <a:latin typeface="Montserrat"/>
+                <a:ea typeface="Montserrat"/>
+                <a:cs typeface="Montserrat"/>
+                <a:sym typeface="Montserrat"/>
+              </a:rPr>
+              <a:t>Binance and Kraken</a:t>
+            </a:r>
+            <a:r>
               <a:rPr lang="en" sz="1500">
                 <a:latin typeface="Montserrat"/>
                 <a:ea typeface="Montserrat"/>
                 <a:cs typeface="Montserrat"/>
                 <a:sym typeface="Montserrat"/>
               </a:rPr>
-              <a:t>Binance and Kraken (price information)</a:t>
+              <a:t> (price information)</a:t>
             </a:r>
             <a:endParaRPr sz="1500">
               <a:latin typeface="Montserrat"/>
@@ -20934,7 +20877,7 @@
                 <a:cs typeface="Montserrat"/>
                 <a:sym typeface="Montserrat"/>
               </a:rPr>
-              <a:t> contains all the Currency Statistics features</a:t>
+              <a:t> contains all the currency statistics features</a:t>
             </a:r>
             <a:endParaRPr sz="1500">
               <a:latin typeface="Montserrat"/>
@@ -20982,7 +20925,16 @@
                 <a:cs typeface="Montserrat"/>
                 <a:sym typeface="Montserrat"/>
               </a:rPr>
-              <a:t>Base features</a:t>
+              <a:t>b</a:t>
+            </a:r>
+            <a:r>
+              <a:rPr b="1" lang="en" sz="1500">
+                <a:latin typeface="Montserrat"/>
+                <a:ea typeface="Montserrat"/>
+                <a:cs typeface="Montserrat"/>
+                <a:sym typeface="Montserrat"/>
+              </a:rPr>
+              <a:t>ase features</a:t>
             </a:r>
             <a:r>
               <a:rPr lang="en" sz="1500">
@@ -21528,6 +21480,13 @@
 <file path=ppt/slides/slide9.xml><?xml version="1.0" encoding="utf-8"?>
 <p:sld xmlns:a="http://schemas.openxmlformats.org/drawingml/2006/main" xmlns:r="http://schemas.openxmlformats.org/officeDocument/2006/relationships" xmlns:mc="http://schemas.openxmlformats.org/markup-compatibility/2006" xmlns:mv="urn:schemas-microsoft-com:mac:vml" xmlns:p="http://schemas.openxmlformats.org/presentationml/2006/main" xmlns:c="http://schemas.openxmlformats.org/drawingml/2006/chart" xmlns:dgm="http://schemas.openxmlformats.org/drawingml/2006/diagram" xmlns:o="urn:schemas-microsoft-com:office:office" xmlns:v="urn:schemas-microsoft-com:vml" xmlns:pvml="urn:schemas-microsoft-com:office:powerpoint" xmlns:com="http://schemas.openxmlformats.org/drawingml/2006/compatibility" xmlns:p14="http://schemas.microsoft.com/office/powerpoint/2010/main" xmlns:p15="http://schemas.microsoft.com/office/powerpoint/2012/main" xmlns:ahyp="http://schemas.microsoft.com/office/drawing/2018/hyperlinkcolor">
   <p:cSld>
+    <p:bg>
+      <p:bgPr>
+        <a:solidFill>
+          <a:schemeClr val="dk1"/>
+        </a:solidFill>
+      </p:bgPr>
+    </p:bg>
     <p:spTree>
       <p:nvGrpSpPr>
         <p:cNvPr id="189" name="Shape 189"/>
@@ -21766,8 +21725,8 @@
         </p:blipFill>
         <p:spPr>
           <a:xfrm>
-            <a:off x="2490776" y="4283263"/>
-            <a:ext cx="4162425" cy="504825"/>
+            <a:off x="2859035" y="4283273"/>
+            <a:ext cx="3425915" cy="415500"/>
           </a:xfrm>
           <a:prstGeom prst="rect">
             <a:avLst/>
@@ -21803,7 +21762,7 @@
           </a:bodyPr>
           <a:lstStyle/>
           <a:p>
-            <a:pPr indent="0" lvl="0" marL="0" rtl="0" algn="ctr">
+            <a:pPr indent="0" lvl="0" marL="0" marR="0" rtl="0" algn="ctr">
               <a:lnSpc>
                 <a:spcPct val="115000"/>
               </a:lnSpc>
@@ -21813,10 +21772,15 @@
               <a:spcAft>
                 <a:spcPts val="0"/>
               </a:spcAft>
+              <a:buClr>
+                <a:srgbClr val="000000"/>
+              </a:buClr>
+              <a:buSzPts val="1500"/>
+              <a:buFont typeface="Arial"/>
               <a:buNone/>
             </a:pPr>
             <a:r>
-              <a:rPr b="1" lang="en" sz="1500">
+              <a:rPr b="1" i="0" lang="en" sz="1500" u="none" cap="none" strike="noStrike">
                 <a:solidFill>
                   <a:schemeClr val="lt1"/>
                 </a:solidFill>
@@ -21827,7 +21791,10 @@
               </a:rPr>
               <a:t>Block Splits</a:t>
             </a:r>
-            <a:endParaRPr b="1">
+            <a:endParaRPr b="1" i="0" sz="1400" u="none" cap="none" strike="noStrike">
+              <a:solidFill>
+                <a:srgbClr val="000000"/>
+              </a:solidFill>
               <a:latin typeface="Montserrat"/>
               <a:ea typeface="Montserrat"/>
               <a:cs typeface="Montserrat"/>
@@ -21861,7 +21828,7 @@
           </a:bodyPr>
           <a:lstStyle/>
           <a:p>
-            <a:pPr indent="0" lvl="0" marL="0" rtl="0" algn="ctr">
+            <a:pPr indent="0" lvl="0" marL="0" marR="0" rtl="0" algn="ctr">
               <a:lnSpc>
                 <a:spcPct val="115000"/>
               </a:lnSpc>
@@ -21871,10 +21838,15 @@
               <a:spcAft>
                 <a:spcPts val="0"/>
               </a:spcAft>
+              <a:buClr>
+                <a:srgbClr val="000000"/>
+              </a:buClr>
+              <a:buSzPts val="1500"/>
+              <a:buFont typeface="Arial"/>
               <a:buNone/>
             </a:pPr>
             <a:r>
-              <a:rPr b="1" lang="en" sz="1500">
+              <a:rPr b="1" i="0" lang="en" sz="1500" u="none" cap="none" strike="noStrike">
                 <a:solidFill>
                   <a:schemeClr val="lt1"/>
                 </a:solidFill>
@@ -21885,7 +21857,10 @@
               </a:rPr>
               <a:t>Walk Forward Splits</a:t>
             </a:r>
-            <a:endParaRPr b="1">
+            <a:endParaRPr b="1" i="0" sz="1400" u="none" cap="none" strike="noStrike">
+              <a:solidFill>
+                <a:srgbClr val="000000"/>
+              </a:solidFill>
               <a:latin typeface="Montserrat"/>
               <a:ea typeface="Montserrat"/>
               <a:cs typeface="Montserrat"/>
@@ -21919,7 +21894,7 @@
           </a:bodyPr>
           <a:lstStyle/>
           <a:p>
-            <a:pPr indent="0" lvl="0" marL="0" rtl="0" algn="ctr">
+            <a:pPr indent="0" lvl="0" marL="0" marR="0" rtl="0" algn="ctr">
               <a:lnSpc>
                 <a:spcPct val="115000"/>
               </a:lnSpc>
@@ -21929,10 +21904,15 @@
               <a:spcAft>
                 <a:spcPts val="0"/>
               </a:spcAft>
+              <a:buClr>
+                <a:srgbClr val="000000"/>
+              </a:buClr>
+              <a:buSzPts val="1500"/>
+              <a:buFont typeface="Arial"/>
               <a:buNone/>
             </a:pPr>
             <a:r>
-              <a:rPr b="1" lang="en" sz="1500">
+              <a:rPr b="1" i="0" lang="en" sz="1500" u="none" cap="none" strike="noStrike">
                 <a:solidFill>
                   <a:schemeClr val="lt1"/>
                 </a:solidFill>
@@ -21943,7 +21923,10 @@
               </a:rPr>
               <a:t>Single split</a:t>
             </a:r>
-            <a:endParaRPr b="1">
+            <a:endParaRPr b="1" i="0" sz="1400" u="none" cap="none" strike="noStrike">
+              <a:solidFill>
+                <a:srgbClr val="000000"/>
+              </a:solidFill>
               <a:latin typeface="Montserrat"/>
               <a:ea typeface="Montserrat"/>
               <a:cs typeface="Montserrat"/>
@@ -21961,6 +21944,285 @@
 </file>
 
 <file path=ppt/theme/theme1.xml><?xml version="1.0" encoding="utf-8"?>
+<a:theme xmlns:a="http://schemas.openxmlformats.org/drawingml/2006/main" xmlns:r="http://schemas.openxmlformats.org/officeDocument/2006/relationships">
+  <a:themeElements>
+    <a:clrScheme name="Default">
+      <a:dk1>
+        <a:srgbClr val="000000"/>
+      </a:dk1>
+      <a:lt1>
+        <a:srgbClr val="FFFFFF"/>
+      </a:lt1>
+      <a:dk2>
+        <a:srgbClr val="158158"/>
+      </a:dk2>
+      <a:lt2>
+        <a:srgbClr val="F3F3F3"/>
+      </a:lt2>
+      <a:accent1>
+        <a:srgbClr val="058DC7"/>
+      </a:accent1>
+      <a:accent2>
+        <a:srgbClr val="50B432"/>
+      </a:accent2>
+      <a:accent3>
+        <a:srgbClr val="ED561B"/>
+      </a:accent3>
+      <a:accent4>
+        <a:srgbClr val="EDEF00"/>
+      </a:accent4>
+      <a:accent5>
+        <a:srgbClr val="24CBE5"/>
+      </a:accent5>
+      <a:accent6>
+        <a:srgbClr val="64E572"/>
+      </a:accent6>
+      <a:hlink>
+        <a:srgbClr val="2200CC"/>
+      </a:hlink>
+      <a:folHlink>
+        <a:srgbClr val="551A8B"/>
+      </a:folHlink>
+    </a:clrScheme>
+    <a:fontScheme name="Office">
+      <a:majorFont>
+        <a:latin typeface="Arial"/>
+        <a:ea typeface=""/>
+        <a:cs typeface=""/>
+        <a:font script="Jpan" typeface="ＭＳ Ｐゴシック"/>
+        <a:font script="Hang" typeface="맑은 고딕"/>
+        <a:font script="Hans" typeface="宋体"/>
+        <a:font script="Hant" typeface="新細明體"/>
+        <a:font script="Arab" typeface="Times New Roman"/>
+        <a:font script="Hebr" typeface="Times New Roman"/>
+        <a:font script="Thai" typeface="Angsana New"/>
+        <a:font script="Ethi" typeface="Nyala"/>
+        <a:font script="Beng" typeface="Vrinda"/>
+        <a:font script="Gujr" typeface="Shruti"/>
+        <a:font script="Khmr" typeface="MoolBoran"/>
+        <a:font script="Knda" typeface="Tunga"/>
+        <a:font script="Guru" typeface="Raavi"/>
+        <a:font script="Cans" typeface="Euphemia"/>
+        <a:font script="Cher" typeface="Plantagenet Cherokee"/>
+        <a:font script="Yiii" typeface="Microsoft Yi Baiti"/>
+        <a:font script="Tibt" typeface="Microsoft Himalaya"/>
+        <a:font script="Thaa" typeface="MV Boli"/>
+        <a:font script="Deva" typeface="Mangal"/>
+        <a:font script="Telu" typeface="Gautami"/>
+        <a:font script="Taml" typeface="Latha"/>
+        <a:font script="Syrc" typeface="Estrangelo Edessa"/>
+        <a:font script="Orya" typeface="Kalinga"/>
+        <a:font script="Mlym" typeface="Kartika"/>
+        <a:font script="Laoo" typeface="DokChampa"/>
+        <a:font script="Sinh" typeface="Iskoola Pota"/>
+        <a:font script="Mong" typeface="Mongolian Baiti"/>
+        <a:font script="Viet" typeface="Times New Roman"/>
+        <a:font script="Uigh" typeface="Microsoft Uighur"/>
+        <a:font script="Geor" typeface="Sylfaen"/>
+      </a:majorFont>
+      <a:minorFont>
+        <a:latin typeface="Arial"/>
+        <a:ea typeface=""/>
+        <a:cs typeface=""/>
+        <a:font script="Jpan" typeface="ＭＳ Ｐゴシック"/>
+        <a:font script="Hang" typeface="맑은 고딕"/>
+        <a:font script="Hans" typeface="宋体"/>
+        <a:font script="Hant" typeface="新細明體"/>
+        <a:font script="Arab" typeface="Arial"/>
+        <a:font script="Hebr" typeface="Arial"/>
+        <a:font script="Thai" typeface="Cordia New"/>
+        <a:font script="Ethi" typeface="Nyala"/>
+        <a:font script="Beng" typeface="Vrinda"/>
+        <a:font script="Gujr" typeface="Shruti"/>
+        <a:font script="Khmr" typeface="DaunPenh"/>
+        <a:font script="Knda" typeface="Tunga"/>
+        <a:font script="Guru" typeface="Raavi"/>
+        <a:font script="Cans" typeface="Euphemia"/>
+        <a:font script="Cher" typeface="Plantagenet Cherokee"/>
+        <a:font script="Yiii" typeface="Microsoft Yi Baiti"/>
+        <a:font script="Tibt" typeface="Microsoft Himalaya"/>
+        <a:font script="Thaa" typeface="MV Boli"/>
+        <a:font script="Deva" typeface="Mangal"/>
+        <a:font script="Telu" typeface="Gautami"/>
+        <a:font script="Taml" typeface="Latha"/>
+        <a:font script="Syrc" typeface="Estrangelo Edessa"/>
+        <a:font script="Orya" typeface="Kalinga"/>
+        <a:font script="Mlym" typeface="Kartika"/>
+        <a:font script="Laoo" typeface="DokChampa"/>
+        <a:font script="Sinh" typeface="Iskoola Pota"/>
+        <a:font script="Mong" typeface="Mongolian Baiti"/>
+        <a:font script="Viet" typeface="Arial"/>
+        <a:font script="Uigh" typeface="Microsoft Uighur"/>
+        <a:font script="Geor" typeface="Sylfaen"/>
+      </a:minorFont>
+    </a:fontScheme>
+    <a:fmtScheme name="Office">
+      <a:fillStyleLst>
+        <a:solidFill>
+          <a:schemeClr val="phClr"/>
+        </a:solidFill>
+        <a:gradFill rotWithShape="1">
+          <a:gsLst>
+            <a:gs pos="0">
+              <a:schemeClr val="phClr">
+                <a:tint val="50000"/>
+                <a:satMod val="300000"/>
+              </a:schemeClr>
+            </a:gs>
+            <a:gs pos="35000">
+              <a:schemeClr val="phClr">
+                <a:tint val="37000"/>
+                <a:satMod val="300000"/>
+              </a:schemeClr>
+            </a:gs>
+            <a:gs pos="100000">
+              <a:schemeClr val="phClr">
+                <a:tint val="15000"/>
+                <a:satMod val="350000"/>
+              </a:schemeClr>
+            </a:gs>
+          </a:gsLst>
+          <a:lin ang="16200000" scaled="1"/>
+        </a:gradFill>
+        <a:gradFill rotWithShape="1">
+          <a:gsLst>
+            <a:gs pos="0">
+              <a:schemeClr val="phClr">
+                <a:tint val="100000"/>
+                <a:shade val="100000"/>
+                <a:satMod val="130000"/>
+              </a:schemeClr>
+            </a:gs>
+            <a:gs pos="100000">
+              <a:schemeClr val="phClr">
+                <a:tint val="50000"/>
+                <a:shade val="100000"/>
+                <a:satMod val="350000"/>
+              </a:schemeClr>
+            </a:gs>
+          </a:gsLst>
+          <a:lin ang="16200000" scaled="0"/>
+        </a:gradFill>
+      </a:fillStyleLst>
+      <a:lnStyleLst>
+        <a:ln w="9525" cap="flat" cmpd="sng" algn="ctr">
+          <a:solidFill>
+            <a:schemeClr val="phClr">
+              <a:shade val="95000"/>
+              <a:satMod val="105000"/>
+            </a:schemeClr>
+          </a:solidFill>
+          <a:prstDash val="solid"/>
+        </a:ln>
+        <a:ln w="25400" cap="flat" cmpd="sng" algn="ctr">
+          <a:solidFill>
+            <a:schemeClr val="phClr"/>
+          </a:solidFill>
+          <a:prstDash val="solid"/>
+        </a:ln>
+        <a:ln w="38100" cap="flat" cmpd="sng" algn="ctr">
+          <a:solidFill>
+            <a:schemeClr val="phClr"/>
+          </a:solidFill>
+          <a:prstDash val="solid"/>
+        </a:ln>
+      </a:lnStyleLst>
+      <a:effectStyleLst>
+        <a:effectStyle>
+          <a:effectLst>
+            <a:outerShdw blurRad="40000" dist="20000" dir="5400000" rotWithShape="0">
+              <a:srgbClr val="000000">
+                <a:alpha val="38000"/>
+              </a:srgbClr>
+            </a:outerShdw>
+          </a:effectLst>
+        </a:effectStyle>
+        <a:effectStyle>
+          <a:effectLst>
+            <a:outerShdw blurRad="40000" dist="23000" dir="5400000" rotWithShape="0">
+              <a:srgbClr val="000000">
+                <a:alpha val="35000"/>
+              </a:srgbClr>
+            </a:outerShdw>
+          </a:effectLst>
+        </a:effectStyle>
+        <a:effectStyle>
+          <a:effectLst>
+            <a:outerShdw blurRad="40000" dist="23000" dir="5400000" rotWithShape="0">
+              <a:srgbClr val="000000">
+                <a:alpha val="35000"/>
+              </a:srgbClr>
+            </a:outerShdw>
+          </a:effectLst>
+          <a:scene3d>
+            <a:camera prst="orthographicFront">
+              <a:rot lat="0" lon="0" rev="0"/>
+            </a:camera>
+            <a:lightRig rig="threePt" dir="t">
+              <a:rot lat="0" lon="0" rev="1200000"/>
+            </a:lightRig>
+          </a:scene3d>
+          <a:sp3d>
+            <a:bevelT w="63500" h="25400"/>
+          </a:sp3d>
+        </a:effectStyle>
+      </a:effectStyleLst>
+      <a:bgFillStyleLst>
+        <a:solidFill>
+          <a:schemeClr val="phClr"/>
+        </a:solidFill>
+        <a:gradFill rotWithShape="1">
+          <a:gsLst>
+            <a:gs pos="0">
+              <a:schemeClr val="phClr">
+                <a:tint val="40000"/>
+                <a:satMod val="350000"/>
+              </a:schemeClr>
+            </a:gs>
+            <a:gs pos="40000">
+              <a:schemeClr val="phClr">
+                <a:tint val="45000"/>
+                <a:shade val="99000"/>
+                <a:satMod val="350000"/>
+              </a:schemeClr>
+            </a:gs>
+            <a:gs pos="100000">
+              <a:schemeClr val="phClr">
+                <a:shade val="20000"/>
+                <a:satMod val="255000"/>
+              </a:schemeClr>
+            </a:gs>
+          </a:gsLst>
+          <a:path path="circle">
+            <a:fillToRect l="50000" t="-80000" r="50000" b="180000"/>
+          </a:path>
+        </a:gradFill>
+        <a:gradFill rotWithShape="1">
+          <a:gsLst>
+            <a:gs pos="0">
+              <a:schemeClr val="phClr">
+                <a:tint val="80000"/>
+                <a:satMod val="300000"/>
+              </a:schemeClr>
+            </a:gs>
+            <a:gs pos="100000">
+              <a:schemeClr val="phClr">
+                <a:shade val="30000"/>
+                <a:satMod val="200000"/>
+              </a:schemeClr>
+            </a:gs>
+          </a:gsLst>
+          <a:path path="circle">
+            <a:fillToRect l="50000" t="50000" r="50000" b="50000"/>
+          </a:path>
+        </a:gradFill>
+      </a:bgFillStyleLst>
+    </a:fmtScheme>
+  </a:themeElements>
+</a:theme>
+</file>
+
+<file path=ppt/theme/theme2.xml><?xml version="1.0" encoding="utf-8"?>
 <a:theme xmlns:a="http://schemas.openxmlformats.org/drawingml/2006/main" xmlns:r="http://schemas.openxmlformats.org/officeDocument/2006/relationships" name="Focus">
   <a:themeElements>
     <a:clrScheme name="Focus">
@@ -22237,283 +22499,4 @@
     </a:fmtScheme>
   </a:themeElements>
 </a:theme>
-</file>
-
-<file path=ppt/theme/theme2.xml><?xml version="1.0" encoding="utf-8"?>
-<a:theme xmlns:a="http://schemas.openxmlformats.org/drawingml/2006/main" xmlns:r="http://schemas.openxmlformats.org/officeDocument/2006/relationships">
-  <a:themeElements>
-    <a:clrScheme name="Default">
-      <a:dk1>
-        <a:srgbClr val="000000"/>
-      </a:dk1>
-      <a:lt1>
-        <a:srgbClr val="FFFFFF"/>
-      </a:lt1>
-      <a:dk2>
-        <a:srgbClr val="158158"/>
-      </a:dk2>
-      <a:lt2>
-        <a:srgbClr val="F3F3F3"/>
-      </a:lt2>
-      <a:accent1>
-        <a:srgbClr val="058DC7"/>
-      </a:accent1>
-      <a:accent2>
-        <a:srgbClr val="50B432"/>
-      </a:accent2>
-      <a:accent3>
-        <a:srgbClr val="ED561B"/>
-      </a:accent3>
-      <a:accent4>
-        <a:srgbClr val="EDEF00"/>
-      </a:accent4>
-      <a:accent5>
-        <a:srgbClr val="24CBE5"/>
-      </a:accent5>
-      <a:accent6>
-        <a:srgbClr val="64E572"/>
-      </a:accent6>
-      <a:hlink>
-        <a:srgbClr val="2200CC"/>
-      </a:hlink>
-      <a:folHlink>
-        <a:srgbClr val="551A8B"/>
-      </a:folHlink>
-    </a:clrScheme>
-    <a:fontScheme name="Office">
-      <a:majorFont>
-        <a:latin typeface="Arial"/>
-        <a:ea typeface=""/>
-        <a:cs typeface=""/>
-        <a:font script="Jpan" typeface="ＭＳ Ｐゴシック"/>
-        <a:font script="Hang" typeface="맑은 고딕"/>
-        <a:font script="Hans" typeface="宋体"/>
-        <a:font script="Hant" typeface="新細明體"/>
-        <a:font script="Arab" typeface="Times New Roman"/>
-        <a:font script="Hebr" typeface="Times New Roman"/>
-        <a:font script="Thai" typeface="Angsana New"/>
-        <a:font script="Ethi" typeface="Nyala"/>
-        <a:font script="Beng" typeface="Vrinda"/>
-        <a:font script="Gujr" typeface="Shruti"/>
-        <a:font script="Khmr" typeface="MoolBoran"/>
-        <a:font script="Knda" typeface="Tunga"/>
-        <a:font script="Guru" typeface="Raavi"/>
-        <a:font script="Cans" typeface="Euphemia"/>
-        <a:font script="Cher" typeface="Plantagenet Cherokee"/>
-        <a:font script="Yiii" typeface="Microsoft Yi Baiti"/>
-        <a:font script="Tibt" typeface="Microsoft Himalaya"/>
-        <a:font script="Thaa" typeface="MV Boli"/>
-        <a:font script="Deva" typeface="Mangal"/>
-        <a:font script="Telu" typeface="Gautami"/>
-        <a:font script="Taml" typeface="Latha"/>
-        <a:font script="Syrc" typeface="Estrangelo Edessa"/>
-        <a:font script="Orya" typeface="Kalinga"/>
-        <a:font script="Mlym" typeface="Kartika"/>
-        <a:font script="Laoo" typeface="DokChampa"/>
-        <a:font script="Sinh" typeface="Iskoola Pota"/>
-        <a:font script="Mong" typeface="Mongolian Baiti"/>
-        <a:font script="Viet" typeface="Times New Roman"/>
-        <a:font script="Uigh" typeface="Microsoft Uighur"/>
-        <a:font script="Geor" typeface="Sylfaen"/>
-      </a:majorFont>
-      <a:minorFont>
-        <a:latin typeface="Arial"/>
-        <a:ea typeface=""/>
-        <a:cs typeface=""/>
-        <a:font script="Jpan" typeface="ＭＳ Ｐゴシック"/>
-        <a:font script="Hang" typeface="맑은 고딕"/>
-        <a:font script="Hans" typeface="宋体"/>
-        <a:font script="Hant" typeface="新細明體"/>
-        <a:font script="Arab" typeface="Arial"/>
-        <a:font script="Hebr" typeface="Arial"/>
-        <a:font script="Thai" typeface="Cordia New"/>
-        <a:font script="Ethi" typeface="Nyala"/>
-        <a:font script="Beng" typeface="Vrinda"/>
-        <a:font script="Gujr" typeface="Shruti"/>
-        <a:font script="Khmr" typeface="DaunPenh"/>
-        <a:font script="Knda" typeface="Tunga"/>
-        <a:font script="Guru" typeface="Raavi"/>
-        <a:font script="Cans" typeface="Euphemia"/>
-        <a:font script="Cher" typeface="Plantagenet Cherokee"/>
-        <a:font script="Yiii" typeface="Microsoft Yi Baiti"/>
-        <a:font script="Tibt" typeface="Microsoft Himalaya"/>
-        <a:font script="Thaa" typeface="MV Boli"/>
-        <a:font script="Deva" typeface="Mangal"/>
-        <a:font script="Telu" typeface="Gautami"/>
-        <a:font script="Taml" typeface="Latha"/>
-        <a:font script="Syrc" typeface="Estrangelo Edessa"/>
-        <a:font script="Orya" typeface="Kalinga"/>
-        <a:font script="Mlym" typeface="Kartika"/>
-        <a:font script="Laoo" typeface="DokChampa"/>
-        <a:font script="Sinh" typeface="Iskoola Pota"/>
-        <a:font script="Mong" typeface="Mongolian Baiti"/>
-        <a:font script="Viet" typeface="Arial"/>
-        <a:font script="Uigh" typeface="Microsoft Uighur"/>
-        <a:font script="Geor" typeface="Sylfaen"/>
-      </a:minorFont>
-    </a:fontScheme>
-    <a:fmtScheme name="Office">
-      <a:fillStyleLst>
-        <a:solidFill>
-          <a:schemeClr val="phClr"/>
-        </a:solidFill>
-        <a:gradFill rotWithShape="1">
-          <a:gsLst>
-            <a:gs pos="0">
-              <a:schemeClr val="phClr">
-                <a:tint val="50000"/>
-                <a:satMod val="300000"/>
-              </a:schemeClr>
-            </a:gs>
-            <a:gs pos="35000">
-              <a:schemeClr val="phClr">
-                <a:tint val="37000"/>
-                <a:satMod val="300000"/>
-              </a:schemeClr>
-            </a:gs>
-            <a:gs pos="100000">
-              <a:schemeClr val="phClr">
-                <a:tint val="15000"/>
-                <a:satMod val="350000"/>
-              </a:schemeClr>
-            </a:gs>
-          </a:gsLst>
-          <a:lin ang="16200000" scaled="1"/>
-        </a:gradFill>
-        <a:gradFill rotWithShape="1">
-          <a:gsLst>
-            <a:gs pos="0">
-              <a:schemeClr val="phClr">
-                <a:tint val="100000"/>
-                <a:shade val="100000"/>
-                <a:satMod val="130000"/>
-              </a:schemeClr>
-            </a:gs>
-            <a:gs pos="100000">
-              <a:schemeClr val="phClr">
-                <a:tint val="50000"/>
-                <a:shade val="100000"/>
-                <a:satMod val="350000"/>
-              </a:schemeClr>
-            </a:gs>
-          </a:gsLst>
-          <a:lin ang="16200000" scaled="0"/>
-        </a:gradFill>
-      </a:fillStyleLst>
-      <a:lnStyleLst>
-        <a:ln w="9525" cap="flat" cmpd="sng" algn="ctr">
-          <a:solidFill>
-            <a:schemeClr val="phClr">
-              <a:shade val="95000"/>
-              <a:satMod val="105000"/>
-            </a:schemeClr>
-          </a:solidFill>
-          <a:prstDash val="solid"/>
-        </a:ln>
-        <a:ln w="25400" cap="flat" cmpd="sng" algn="ctr">
-          <a:solidFill>
-            <a:schemeClr val="phClr"/>
-          </a:solidFill>
-          <a:prstDash val="solid"/>
-        </a:ln>
-        <a:ln w="38100" cap="flat" cmpd="sng" algn="ctr">
-          <a:solidFill>
-            <a:schemeClr val="phClr"/>
-          </a:solidFill>
-          <a:prstDash val="solid"/>
-        </a:ln>
-      </a:lnStyleLst>
-      <a:effectStyleLst>
-        <a:effectStyle>
-          <a:effectLst>
-            <a:outerShdw blurRad="40000" dist="20000" dir="5400000" rotWithShape="0">
-              <a:srgbClr val="000000">
-                <a:alpha val="38000"/>
-              </a:srgbClr>
-            </a:outerShdw>
-          </a:effectLst>
-        </a:effectStyle>
-        <a:effectStyle>
-          <a:effectLst>
-            <a:outerShdw blurRad="40000" dist="23000" dir="5400000" rotWithShape="0">
-              <a:srgbClr val="000000">
-                <a:alpha val="35000"/>
-              </a:srgbClr>
-            </a:outerShdw>
-          </a:effectLst>
-        </a:effectStyle>
-        <a:effectStyle>
-          <a:effectLst>
-            <a:outerShdw blurRad="40000" dist="23000" dir="5400000" rotWithShape="0">
-              <a:srgbClr val="000000">
-                <a:alpha val="35000"/>
-              </a:srgbClr>
-            </a:outerShdw>
-          </a:effectLst>
-          <a:scene3d>
-            <a:camera prst="orthographicFront">
-              <a:rot lat="0" lon="0" rev="0"/>
-            </a:camera>
-            <a:lightRig rig="threePt" dir="t">
-              <a:rot lat="0" lon="0" rev="1200000"/>
-            </a:lightRig>
-          </a:scene3d>
-          <a:sp3d>
-            <a:bevelT w="63500" h="25400"/>
-          </a:sp3d>
-        </a:effectStyle>
-      </a:effectStyleLst>
-      <a:bgFillStyleLst>
-        <a:solidFill>
-          <a:schemeClr val="phClr"/>
-        </a:solidFill>
-        <a:gradFill rotWithShape="1">
-          <a:gsLst>
-            <a:gs pos="0">
-              <a:schemeClr val="phClr">
-                <a:tint val="40000"/>
-                <a:satMod val="350000"/>
-              </a:schemeClr>
-            </a:gs>
-            <a:gs pos="40000">
-              <a:schemeClr val="phClr">
-                <a:tint val="45000"/>
-                <a:shade val="99000"/>
-                <a:satMod val="350000"/>
-              </a:schemeClr>
-            </a:gs>
-            <a:gs pos="100000">
-              <a:schemeClr val="phClr">
-                <a:shade val="20000"/>
-                <a:satMod val="255000"/>
-              </a:schemeClr>
-            </a:gs>
-          </a:gsLst>
-          <a:path path="circle">
-            <a:fillToRect l="50000" t="-80000" r="50000" b="180000"/>
-          </a:path>
-        </a:gradFill>
-        <a:gradFill rotWithShape="1">
-          <a:gsLst>
-            <a:gs pos="0">
-              <a:schemeClr val="phClr">
-                <a:tint val="80000"/>
-                <a:satMod val="300000"/>
-              </a:schemeClr>
-            </a:gs>
-            <a:gs pos="100000">
-              <a:schemeClr val="phClr">
-                <a:shade val="30000"/>
-                <a:satMod val="200000"/>
-              </a:schemeClr>
-            </a:gs>
-          </a:gsLst>
-          <a:path path="circle">
-            <a:fillToRect l="50000" t="50000" r="50000" b="50000"/>
-          </a:path>
-        </a:gradFill>
-      </a:bgFillStyleLst>
-    </a:fmtScheme>
-  </a:themeElements>
-</a:theme>
 </file>
</xml_diff>